<commit_message>
dynamodb table output updated
</commit_message>
<xml_diff>
--- a/Lectures2024/CITS5503Storage_week4.pptx
+++ b/Lectures2024/CITS5503Storage_week4.pptx
@@ -4543,7 +4543,7 @@
   <pc:docChgLst>
     <pc:chgData name="张 智" userId="36bdf691fd3510be" providerId="LiveId" clId="{D586C6AE-3878-4CEA-8066-FE114F9BACE0}"/>
     <pc:docChg chg="undo custSel addSld delSld modSld sldOrd modSection">
-      <pc:chgData name="张 智" userId="36bdf691fd3510be" providerId="LiveId" clId="{D586C6AE-3878-4CEA-8066-FE114F9BACE0}" dt="2024-08-13T04:17:47.639" v="13492" actId="20577"/>
+      <pc:chgData name="张 智" userId="36bdf691fd3510be" providerId="LiveId" clId="{D586C6AE-3878-4CEA-8066-FE114F9BACE0}" dt="2024-08-13T04:43:27.791" v="13575" actId="20577"/>
       <pc:docMkLst>
         <pc:docMk/>
       </pc:docMkLst>
@@ -4698,7 +4698,7 @@
         </pc:sldMkLst>
       </pc:sldChg>
       <pc:sldChg chg="addSp delSp modSp mod modNotesTx">
-        <pc:chgData name="张 智" userId="36bdf691fd3510be" providerId="LiveId" clId="{D586C6AE-3878-4CEA-8066-FE114F9BACE0}" dt="2024-08-12T03:28:13.457" v="1595" actId="20577"/>
+        <pc:chgData name="张 智" userId="36bdf691fd3510be" providerId="LiveId" clId="{D586C6AE-3878-4CEA-8066-FE114F9BACE0}" dt="2024-08-13T04:40:23.543" v="13548" actId="20577"/>
         <pc:sldMkLst>
           <pc:docMk/>
           <pc:sldMk cId="1576737635" sldId="1346"/>
@@ -5278,6 +5278,13 @@
           <pc:sldMk cId="3181990880" sldId="1404"/>
         </pc:sldMkLst>
       </pc:sldChg>
+      <pc:sldChg chg="modNotesTx">
+        <pc:chgData name="张 智" userId="36bdf691fd3510be" providerId="LiveId" clId="{D586C6AE-3878-4CEA-8066-FE114F9BACE0}" dt="2024-08-13T04:38:38.315" v="13540" actId="20577"/>
+        <pc:sldMkLst>
+          <pc:docMk/>
+          <pc:sldMk cId="3715612443" sldId="1407"/>
+        </pc:sldMkLst>
+      </pc:sldChg>
       <pc:sldChg chg="modSp mod modNotesTx">
         <pc:chgData name="张 智" userId="36bdf691fd3510be" providerId="LiveId" clId="{D586C6AE-3878-4CEA-8066-FE114F9BACE0}" dt="2024-08-13T01:13:17.623" v="9111" actId="20577"/>
         <pc:sldMkLst>
@@ -5300,26 +5307,34 @@
           <pc:sldMk cId="377486972" sldId="1410"/>
         </pc:sldMkLst>
       </pc:sldChg>
-      <pc:sldChg chg="addSp modSp mod modNotesTx">
-        <pc:chgData name="张 智" userId="36bdf691fd3510be" providerId="LiveId" clId="{D586C6AE-3878-4CEA-8066-FE114F9BACE0}" dt="2024-08-13T01:45:37.047" v="9962" actId="14100"/>
+      <pc:sldChg chg="addSp delSp modSp mod modNotesTx">
+        <pc:chgData name="张 智" userId="36bdf691fd3510be" providerId="LiveId" clId="{D586C6AE-3878-4CEA-8066-FE114F9BACE0}" dt="2024-08-13T04:43:27.791" v="13575" actId="20577"/>
         <pc:sldMkLst>
           <pc:docMk/>
           <pc:sldMk cId="756599437" sldId="1411"/>
         </pc:sldMkLst>
         <pc:spChg chg="add mod">
-          <ac:chgData name="张 智" userId="36bdf691fd3510be" providerId="LiveId" clId="{D586C6AE-3878-4CEA-8066-FE114F9BACE0}" dt="2024-08-13T01:45:37.047" v="9962" actId="14100"/>
+          <ac:chgData name="张 智" userId="36bdf691fd3510be" providerId="LiveId" clId="{D586C6AE-3878-4CEA-8066-FE114F9BACE0}" dt="2024-08-13T04:43:02.747" v="13559" actId="1076"/>
           <ac:spMkLst>
             <pc:docMk/>
             <pc:sldMk cId="756599437" sldId="1411"/>
             <ac:spMk id="6" creationId="{E3DF4675-0FA0-47ED-8B33-4F5D225F65E4}"/>
           </ac:spMkLst>
         </pc:spChg>
-        <pc:graphicFrameChg chg="add mod modGraphic">
-          <ac:chgData name="张 智" userId="36bdf691fd3510be" providerId="LiveId" clId="{D586C6AE-3878-4CEA-8066-FE114F9BACE0}" dt="2024-08-13T01:45:29.047" v="9959" actId="1076"/>
+        <pc:graphicFrameChg chg="add del mod modGraphic">
+          <ac:chgData name="张 智" userId="36bdf691fd3510be" providerId="LiveId" clId="{D586C6AE-3878-4CEA-8066-FE114F9BACE0}" dt="2024-08-13T04:42:58.042" v="13556" actId="478"/>
           <ac:graphicFrameMkLst>
             <pc:docMk/>
             <pc:sldMk cId="756599437" sldId="1411"/>
             <ac:graphicFrameMk id="3" creationId="{FDEFAC46-F018-4629-A381-47F4C7422364}"/>
+          </ac:graphicFrameMkLst>
+        </pc:graphicFrameChg>
+        <pc:graphicFrameChg chg="add mod">
+          <ac:chgData name="张 智" userId="36bdf691fd3510be" providerId="LiveId" clId="{D586C6AE-3878-4CEA-8066-FE114F9BACE0}" dt="2024-08-13T04:43:05.147" v="13560" actId="1076"/>
+          <ac:graphicFrameMkLst>
+            <pc:docMk/>
+            <pc:sldMk cId="756599437" sldId="1411"/>
+            <ac:graphicFrameMk id="8" creationId="{1904C19E-C4C0-4498-AE9E-D77C59F817A4}"/>
           </ac:graphicFrameMkLst>
         </pc:graphicFrameChg>
       </pc:sldChg>
@@ -5346,8 +5361,8 @@
           </ac:spMkLst>
         </pc:spChg>
       </pc:sldChg>
-      <pc:sldChg chg="addSp modSp mod">
-        <pc:chgData name="张 智" userId="36bdf691fd3510be" providerId="LiveId" clId="{D586C6AE-3878-4CEA-8066-FE114F9BACE0}" dt="2024-08-13T01:45:21.160" v="9958" actId="1076"/>
+      <pc:sldChg chg="addSp delSp modSp mod">
+        <pc:chgData name="张 智" userId="36bdf691fd3510be" providerId="LiveId" clId="{D586C6AE-3878-4CEA-8066-FE114F9BACE0}" dt="2024-08-13T04:42:49.843" v="13555" actId="1076"/>
         <pc:sldMkLst>
           <pc:docMk/>
           <pc:sldMk cId="1228466319" sldId="1414"/>
@@ -5361,19 +5376,27 @@
           </ac:spMkLst>
         </pc:spChg>
         <pc:spChg chg="add mod">
-          <ac:chgData name="张 智" userId="36bdf691fd3510be" providerId="LiveId" clId="{D586C6AE-3878-4CEA-8066-FE114F9BACE0}" dt="2024-08-13T01:45:21.160" v="9958" actId="1076"/>
+          <ac:chgData name="张 智" userId="36bdf691fd3510be" providerId="LiveId" clId="{D586C6AE-3878-4CEA-8066-FE114F9BACE0}" dt="2024-08-13T04:42:47.019" v="13554" actId="1076"/>
           <ac:spMkLst>
             <pc:docMk/>
             <pc:sldMk cId="1228466319" sldId="1414"/>
             <ac:spMk id="9" creationId="{41F081B1-B1DD-4AB5-8BDA-74A73F8329EA}"/>
           </ac:spMkLst>
         </pc:spChg>
-        <pc:graphicFrameChg chg="add mod modGraphic">
-          <ac:chgData name="张 智" userId="36bdf691fd3510be" providerId="LiveId" clId="{D586C6AE-3878-4CEA-8066-FE114F9BACE0}" dt="2024-08-13T01:42:20.680" v="9850" actId="14734"/>
+        <pc:graphicFrameChg chg="add del mod modGraphic">
+          <ac:chgData name="张 智" userId="36bdf691fd3510be" providerId="LiveId" clId="{D586C6AE-3878-4CEA-8066-FE114F9BACE0}" dt="2024-08-13T04:42:37.397" v="13552" actId="478"/>
           <ac:graphicFrameMkLst>
             <pc:docMk/>
             <pc:sldMk cId="1228466319" sldId="1414"/>
             <ac:graphicFrameMk id="7" creationId="{C30CEB76-25F0-45C8-AE13-AB808C1864B2}"/>
+          </ac:graphicFrameMkLst>
+        </pc:graphicFrameChg>
+        <pc:graphicFrameChg chg="add mod modGraphic">
+          <ac:chgData name="张 智" userId="36bdf691fd3510be" providerId="LiveId" clId="{D586C6AE-3878-4CEA-8066-FE114F9BACE0}" dt="2024-08-13T04:42:49.843" v="13555" actId="1076"/>
+          <ac:graphicFrameMkLst>
+            <pc:docMk/>
+            <pc:sldMk cId="1228466319" sldId="1414"/>
+            <ac:graphicFrameMk id="10" creationId="{147575B5-83AE-43A9-A8EA-B6CAB2A5F2C1}"/>
           </ac:graphicFrameMkLst>
         </pc:graphicFrameChg>
       </pc:sldChg>
@@ -37728,12 +37751,84 @@
           </a:p>
         </p:txBody>
       </p:sp>
+      <p:sp>
+        <p:nvSpPr>
+          <p:cNvPr id="9" name="Title 1">
+            <a:extLst>
+              <a:ext uri="{FF2B5EF4-FFF2-40B4-BE49-F238E27FC236}">
+                <a16:creationId xmlns:a16="http://schemas.microsoft.com/office/drawing/2014/main" id="{41F081B1-B1DD-4AB5-8BDA-74A73F8329EA}"/>
+              </a:ext>
+            </a:extLst>
+          </p:cNvPr>
+          <p:cNvSpPr txBox="1">
+            <a:spLocks/>
+          </p:cNvSpPr>
+          <p:nvPr/>
+        </p:nvSpPr>
+        <p:spPr>
+          <a:xfrm>
+            <a:off x="604292" y="3707454"/>
+            <a:ext cx="4639512" cy="704476"/>
+          </a:xfrm>
+          <a:prstGeom prst="rect">
+            <a:avLst/>
+          </a:prstGeom>
+        </p:spPr>
+        <p:txBody>
+          <a:bodyPr vert="horz" lIns="91440" tIns="45720" rIns="91440" bIns="45720" rtlCol="0" anchor="ctr">
+            <a:normAutofit/>
+          </a:bodyPr>
+          <a:lstStyle>
+            <a:lvl1pPr algn="l" defTabSz="914400" rtl="0" eaLnBrk="1" latinLnBrk="0" hangingPunct="1">
+              <a:lnSpc>
+                <a:spcPct val="90000"/>
+              </a:lnSpc>
+              <a:spcBef>
+                <a:spcPct val="0"/>
+              </a:spcBef>
+              <a:buNone/>
+              <a:defRPr sz="4400" kern="1200">
+                <a:solidFill>
+                  <a:schemeClr val="tx1"/>
+                </a:solidFill>
+                <a:latin typeface="+mj-lt"/>
+                <a:ea typeface="+mj-ea"/>
+                <a:cs typeface="+mj-cs"/>
+              </a:defRPr>
+            </a:lvl1pPr>
+          </a:lstStyle>
+          <a:p>
+            <a:pPr marL="342900" indent="-342900" fontAlgn="auto">
+              <a:spcAft>
+                <a:spcPts val="0"/>
+              </a:spcAft>
+              <a:buClrTx/>
+              <a:buSzTx/>
+              <a:buFont typeface="Arial" panose="020B0604020202020204" pitchFamily="34" charset="0"/>
+              <a:buChar char="•"/>
+            </a:pPr>
+            <a:r>
+              <a:rPr lang="en-AU" sz="2400" dirty="0">
+                <a:latin typeface="+mn-lt"/>
+                <a:ea typeface="+mn-ea"/>
+                <a:cs typeface="+mn-cs"/>
+              </a:rPr>
+              <a:t>Table output:</a:t>
+            </a:r>
+            <a:endParaRPr lang="en-US" sz="2400" dirty="0">
+              <a:latin typeface="+mn-lt"/>
+              <a:ea typeface="+mn-ea"/>
+              <a:cs typeface="+mn-cs"/>
+            </a:endParaRPr>
+          </a:p>
+        </p:txBody>
+      </p:sp>
       <p:graphicFrame>
         <p:nvGraphicFramePr>
-          <p:cNvPr id="7" name="Table 7">
+          <p:cNvPr id="10" name="Table 7">
             <a:extLst>
               <a:ext uri="{FF2B5EF4-FFF2-40B4-BE49-F238E27FC236}">
-                <a16:creationId xmlns:a16="http://schemas.microsoft.com/office/drawing/2014/main" id="{C30CEB76-25F0-45C8-AE13-AB808C1864B2}"/>
+                <a16:creationId xmlns:a16="http://schemas.microsoft.com/office/drawing/2014/main" id="{147575B5-83AE-43A9-A8EA-B6CAB2A5F2C1}"/>
               </a:ext>
             </a:extLst>
           </p:cNvPr>
@@ -37743,14 +37838,14 @@
           <p:nvPr>
             <p:extLst>
               <p:ext uri="{D42A27DB-BD31-4B8C-83A1-F6EECF244321}">
-                <p14:modId xmlns:p14="http://schemas.microsoft.com/office/powerpoint/2010/main" val="3996343867"/>
+                <p14:modId xmlns:p14="http://schemas.microsoft.com/office/powerpoint/2010/main" val="3711599521"/>
               </p:ext>
             </p:extLst>
           </p:nvPr>
         </p:nvGraphicFramePr>
         <p:xfrm>
-          <a:off x="604292" y="4727275"/>
-          <a:ext cx="8127999" cy="704476"/>
+          <a:off x="690346" y="4411930"/>
+          <a:ext cx="8127999" cy="1755422"/>
         </p:xfrm>
         <a:graphic>
           <a:graphicData uri="http://schemas.openxmlformats.org/drawingml/2006/table">
@@ -37781,7 +37876,184 @@
                   </a:extLst>
                 </a:gridCol>
               </a:tblGrid>
-              <a:tr h="704476">
+              <a:tr h="877711">
+                <a:tc>
+                  <a:txBody>
+                    <a:bodyPr/>
+                    <a:lstStyle/>
+                    <a:p>
+                      <a:r>
+                        <a:rPr lang="en-AU" dirty="0">
+                          <a:solidFill>
+                            <a:schemeClr val="tx1"/>
+                          </a:solidFill>
+                        </a:rPr>
+                        <a:t>Artist</a:t>
+                      </a:r>
+                    </a:p>
+                  </a:txBody>
+                  <a:tcPr>
+                    <a:lnL w="12700" cap="flat" cmpd="sng" algn="ctr">
+                      <a:solidFill>
+                        <a:schemeClr val="tx1"/>
+                      </a:solidFill>
+                      <a:prstDash val="solid"/>
+                      <a:round/>
+                      <a:headEnd type="none" w="med" len="med"/>
+                      <a:tailEnd type="none" w="med" len="med"/>
+                    </a:lnL>
+                    <a:lnR w="12700" cap="flat" cmpd="sng" algn="ctr">
+                      <a:solidFill>
+                        <a:schemeClr val="tx1"/>
+                      </a:solidFill>
+                      <a:prstDash val="solid"/>
+                      <a:round/>
+                      <a:headEnd type="none" w="med" len="med"/>
+                      <a:tailEnd type="none" w="med" len="med"/>
+                    </a:lnR>
+                    <a:lnT w="12700" cap="flat" cmpd="sng" algn="ctr">
+                      <a:solidFill>
+                        <a:schemeClr val="tx1"/>
+                      </a:solidFill>
+                      <a:prstDash val="solid"/>
+                      <a:round/>
+                      <a:headEnd type="none" w="med" len="med"/>
+                      <a:tailEnd type="none" w="med" len="med"/>
+                    </a:lnT>
+                    <a:lnB w="12700" cap="flat" cmpd="sng" algn="ctr">
+                      <a:solidFill>
+                        <a:schemeClr val="tx1"/>
+                      </a:solidFill>
+                      <a:prstDash val="solid"/>
+                      <a:round/>
+                      <a:headEnd type="none" w="med" len="med"/>
+                      <a:tailEnd type="none" w="med" len="med"/>
+                    </a:lnB>
+                    <a:noFill/>
+                  </a:tcPr>
+                </a:tc>
+                <a:tc>
+                  <a:txBody>
+                    <a:bodyPr/>
+                    <a:lstStyle/>
+                    <a:p>
+                      <a:r>
+                        <a:rPr lang="en-AU" dirty="0">
+                          <a:solidFill>
+                            <a:schemeClr val="tx1"/>
+                          </a:solidFill>
+                        </a:rPr>
+                        <a:t>Song</a:t>
+                      </a:r>
+                    </a:p>
+                  </a:txBody>
+                  <a:tcPr>
+                    <a:lnL w="12700" cap="flat" cmpd="sng" algn="ctr">
+                      <a:solidFill>
+                        <a:schemeClr val="tx1"/>
+                      </a:solidFill>
+                      <a:prstDash val="solid"/>
+                      <a:round/>
+                      <a:headEnd type="none" w="med" len="med"/>
+                      <a:tailEnd type="none" w="med" len="med"/>
+                    </a:lnL>
+                    <a:lnR w="12700" cap="flat" cmpd="sng" algn="ctr">
+                      <a:solidFill>
+                        <a:schemeClr val="tx1"/>
+                      </a:solidFill>
+                      <a:prstDash val="solid"/>
+                      <a:round/>
+                      <a:headEnd type="none" w="med" len="med"/>
+                      <a:tailEnd type="none" w="med" len="med"/>
+                    </a:lnR>
+                    <a:lnT w="12700" cap="flat" cmpd="sng" algn="ctr">
+                      <a:solidFill>
+                        <a:schemeClr val="tx1"/>
+                      </a:solidFill>
+                      <a:prstDash val="solid"/>
+                      <a:round/>
+                      <a:headEnd type="none" w="med" len="med"/>
+                      <a:tailEnd type="none" w="med" len="med"/>
+                    </a:lnT>
+                    <a:lnB w="12700" cap="flat" cmpd="sng" algn="ctr">
+                      <a:solidFill>
+                        <a:schemeClr val="tx1"/>
+                      </a:solidFill>
+                      <a:prstDash val="solid"/>
+                      <a:round/>
+                      <a:headEnd type="none" w="med" len="med"/>
+                      <a:tailEnd type="none" w="med" len="med"/>
+                    </a:lnB>
+                    <a:noFill/>
+                  </a:tcPr>
+                </a:tc>
+                <a:tc>
+                  <a:txBody>
+                    <a:bodyPr/>
+                    <a:lstStyle/>
+                    <a:p>
+                      <a:r>
+                        <a:rPr lang="en-AU" dirty="0" err="1">
+                          <a:solidFill>
+                            <a:schemeClr val="tx1"/>
+                          </a:solidFill>
+                        </a:rPr>
+                        <a:t>AlbumTitle</a:t>
+                      </a:r>
+                      <a:endParaRPr lang="en-AU" dirty="0">
+                        <a:solidFill>
+                          <a:schemeClr val="tx1"/>
+                        </a:solidFill>
+                      </a:endParaRPr>
+                    </a:p>
+                  </a:txBody>
+                  <a:tcPr>
+                    <a:lnL w="12700" cap="flat" cmpd="sng" algn="ctr">
+                      <a:solidFill>
+                        <a:schemeClr val="tx1"/>
+                      </a:solidFill>
+                      <a:prstDash val="solid"/>
+                      <a:round/>
+                      <a:headEnd type="none" w="med" len="med"/>
+                      <a:tailEnd type="none" w="med" len="med"/>
+                    </a:lnL>
+                    <a:lnR w="12700" cap="flat" cmpd="sng" algn="ctr">
+                      <a:solidFill>
+                        <a:schemeClr val="tx1"/>
+                      </a:solidFill>
+                      <a:prstDash val="solid"/>
+                      <a:round/>
+                      <a:headEnd type="none" w="med" len="med"/>
+                      <a:tailEnd type="none" w="med" len="med"/>
+                    </a:lnR>
+                    <a:lnT w="12700" cap="flat" cmpd="sng" algn="ctr">
+                      <a:solidFill>
+                        <a:schemeClr val="tx1"/>
+                      </a:solidFill>
+                      <a:prstDash val="solid"/>
+                      <a:round/>
+                      <a:headEnd type="none" w="med" len="med"/>
+                      <a:tailEnd type="none" w="med" len="med"/>
+                    </a:lnT>
+                    <a:lnB w="12700" cap="flat" cmpd="sng" algn="ctr">
+                      <a:solidFill>
+                        <a:schemeClr val="tx1"/>
+                      </a:solidFill>
+                      <a:prstDash val="solid"/>
+                      <a:round/>
+                      <a:headEnd type="none" w="med" len="med"/>
+                      <a:tailEnd type="none" w="med" len="med"/>
+                    </a:lnB>
+                    <a:noFill/>
+                  </a:tcPr>
+                </a:tc>
+                <a:extLst>
+                  <a:ext uri="{0D108BD9-81ED-4DB2-BD59-A6C34878D82A}">
+                    <a16:rowId xmlns:a16="http://schemas.microsoft.com/office/drawing/2014/main" val="1382315626"/>
+                  </a:ext>
+                </a:extLst>
+              </a:tr>
+              <a:tr h="877711">
                 <a:tc>
                   <a:txBody>
                     <a:bodyPr/>
@@ -37966,78 +38238,6 @@
           </a:graphicData>
         </a:graphic>
       </p:graphicFrame>
-      <p:sp>
-        <p:nvSpPr>
-          <p:cNvPr id="9" name="Title 1">
-            <a:extLst>
-              <a:ext uri="{FF2B5EF4-FFF2-40B4-BE49-F238E27FC236}">
-                <a16:creationId xmlns:a16="http://schemas.microsoft.com/office/drawing/2014/main" id="{41F081B1-B1DD-4AB5-8BDA-74A73F8329EA}"/>
-              </a:ext>
-            </a:extLst>
-          </p:cNvPr>
-          <p:cNvSpPr txBox="1">
-            <a:spLocks/>
-          </p:cNvSpPr>
-          <p:nvPr/>
-        </p:nvSpPr>
-        <p:spPr>
-          <a:xfrm>
-            <a:off x="604292" y="4022799"/>
-            <a:ext cx="4639512" cy="704476"/>
-          </a:xfrm>
-          <a:prstGeom prst="rect">
-            <a:avLst/>
-          </a:prstGeom>
-        </p:spPr>
-        <p:txBody>
-          <a:bodyPr vert="horz" lIns="91440" tIns="45720" rIns="91440" bIns="45720" rtlCol="0" anchor="ctr">
-            <a:normAutofit/>
-          </a:bodyPr>
-          <a:lstStyle>
-            <a:lvl1pPr algn="l" defTabSz="914400" rtl="0" eaLnBrk="1" latinLnBrk="0" hangingPunct="1">
-              <a:lnSpc>
-                <a:spcPct val="90000"/>
-              </a:lnSpc>
-              <a:spcBef>
-                <a:spcPct val="0"/>
-              </a:spcBef>
-              <a:buNone/>
-              <a:defRPr sz="4400" kern="1200">
-                <a:solidFill>
-                  <a:schemeClr val="tx1"/>
-                </a:solidFill>
-                <a:latin typeface="+mj-lt"/>
-                <a:ea typeface="+mj-ea"/>
-                <a:cs typeface="+mj-cs"/>
-              </a:defRPr>
-            </a:lvl1pPr>
-          </a:lstStyle>
-          <a:p>
-            <a:pPr marL="342900" indent="-342900" fontAlgn="auto">
-              <a:spcAft>
-                <a:spcPts val="0"/>
-              </a:spcAft>
-              <a:buClrTx/>
-              <a:buSzTx/>
-              <a:buFont typeface="Arial" panose="020B0604020202020204" pitchFamily="34" charset="0"/>
-              <a:buChar char="•"/>
-            </a:pPr>
-            <a:r>
-              <a:rPr lang="en-AU" sz="2400" dirty="0">
-                <a:latin typeface="+mn-lt"/>
-                <a:ea typeface="+mn-ea"/>
-                <a:cs typeface="+mn-cs"/>
-              </a:rPr>
-              <a:t>Table output:</a:t>
-            </a:r>
-            <a:endParaRPr lang="en-US" sz="2400" dirty="0">
-              <a:latin typeface="+mn-lt"/>
-              <a:ea typeface="+mn-ea"/>
-              <a:cs typeface="+mn-cs"/>
-            </a:endParaRPr>
-          </a:p>
-        </p:txBody>
-      </p:sp>
     </p:spTree>
     <p:extLst>
       <p:ext uri="{BB962C8B-B14F-4D97-AF65-F5344CB8AC3E}">
@@ -38267,12 +38467,84 @@
           </a:p>
         </p:txBody>
       </p:sp>
+      <p:sp>
+        <p:nvSpPr>
+          <p:cNvPr id="6" name="Title 1">
+            <a:extLst>
+              <a:ext uri="{FF2B5EF4-FFF2-40B4-BE49-F238E27FC236}">
+                <a16:creationId xmlns:a16="http://schemas.microsoft.com/office/drawing/2014/main" id="{E3DF4675-0FA0-47ED-8B33-4F5D225F65E4}"/>
+              </a:ext>
+            </a:extLst>
+          </p:cNvPr>
+          <p:cNvSpPr txBox="1">
+            <a:spLocks/>
+          </p:cNvSpPr>
+          <p:nvPr/>
+        </p:nvSpPr>
+        <p:spPr>
+          <a:xfrm>
+            <a:off x="755516" y="2782452"/>
+            <a:ext cx="3443260" cy="704476"/>
+          </a:xfrm>
+          <a:prstGeom prst="rect">
+            <a:avLst/>
+          </a:prstGeom>
+        </p:spPr>
+        <p:txBody>
+          <a:bodyPr vert="horz" lIns="91440" tIns="45720" rIns="91440" bIns="45720" rtlCol="0" anchor="ctr">
+            <a:normAutofit/>
+          </a:bodyPr>
+          <a:lstStyle>
+            <a:lvl1pPr algn="l" defTabSz="914400" rtl="0" eaLnBrk="1" latinLnBrk="0" hangingPunct="1">
+              <a:lnSpc>
+                <a:spcPct val="90000"/>
+              </a:lnSpc>
+              <a:spcBef>
+                <a:spcPct val="0"/>
+              </a:spcBef>
+              <a:buNone/>
+              <a:defRPr sz="4400" kern="1200">
+                <a:solidFill>
+                  <a:schemeClr val="tx1"/>
+                </a:solidFill>
+                <a:latin typeface="+mj-lt"/>
+                <a:ea typeface="+mj-ea"/>
+                <a:cs typeface="+mj-cs"/>
+              </a:defRPr>
+            </a:lvl1pPr>
+          </a:lstStyle>
+          <a:p>
+            <a:pPr marL="342900" indent="-342900" fontAlgn="auto">
+              <a:spcAft>
+                <a:spcPts val="0"/>
+              </a:spcAft>
+              <a:buClrTx/>
+              <a:buSzTx/>
+              <a:buFont typeface="Arial" panose="020B0604020202020204" pitchFamily="34" charset="0"/>
+              <a:buChar char="•"/>
+            </a:pPr>
+            <a:r>
+              <a:rPr lang="en-AU" sz="2400" dirty="0">
+                <a:latin typeface="+mn-lt"/>
+                <a:ea typeface="+mn-ea"/>
+                <a:cs typeface="+mn-cs"/>
+              </a:rPr>
+              <a:t>Table output:</a:t>
+            </a:r>
+            <a:endParaRPr lang="en-US" sz="2400" dirty="0">
+              <a:latin typeface="+mn-lt"/>
+              <a:ea typeface="+mn-ea"/>
+              <a:cs typeface="+mn-cs"/>
+            </a:endParaRPr>
+          </a:p>
+        </p:txBody>
+      </p:sp>
       <p:graphicFrame>
         <p:nvGraphicFramePr>
-          <p:cNvPr id="3" name="Table 2">
+          <p:cNvPr id="8" name="Table 7">
             <a:extLst>
               <a:ext uri="{FF2B5EF4-FFF2-40B4-BE49-F238E27FC236}">
-                <a16:creationId xmlns:a16="http://schemas.microsoft.com/office/drawing/2014/main" id="{FDEFAC46-F018-4629-A381-47F4C7422364}"/>
+                <a16:creationId xmlns:a16="http://schemas.microsoft.com/office/drawing/2014/main" id="{1904C19E-C4C0-4498-AE9E-D77C59F817A4}"/>
               </a:ext>
             </a:extLst>
           </p:cNvPr>
@@ -38282,14 +38554,14 @@
           <p:nvPr>
             <p:extLst>
               <p:ext uri="{D42A27DB-BD31-4B8C-83A1-F6EECF244321}">
-                <p14:modId xmlns:p14="http://schemas.microsoft.com/office/powerpoint/2010/main" val="1542772966"/>
+                <p14:modId xmlns:p14="http://schemas.microsoft.com/office/powerpoint/2010/main" val="241571100"/>
               </p:ext>
             </p:extLst>
           </p:nvPr>
         </p:nvGraphicFramePr>
         <p:xfrm>
-          <a:off x="755516" y="3934343"/>
-          <a:ext cx="8127999" cy="1755422"/>
+          <a:off x="755516" y="3648286"/>
+          <a:ext cx="8127999" cy="2633133"/>
         </p:xfrm>
         <a:graphic>
           <a:graphicData uri="http://schemas.openxmlformats.org/drawingml/2006/table">
@@ -38301,25 +38573,202 @@
                 <a:gridCol w="2709333">
                   <a:extLst>
                     <a:ext uri="{9D8B030D-6E8A-4147-A177-3AD203B41FA5}">
-                      <a16:colId xmlns:a16="http://schemas.microsoft.com/office/drawing/2014/main" val="281140170"/>
+                      <a16:colId xmlns:a16="http://schemas.microsoft.com/office/drawing/2014/main" val="888033732"/>
                     </a:ext>
                   </a:extLst>
                 </a:gridCol>
                 <a:gridCol w="2709333">
                   <a:extLst>
                     <a:ext uri="{9D8B030D-6E8A-4147-A177-3AD203B41FA5}">
-                      <a16:colId xmlns:a16="http://schemas.microsoft.com/office/drawing/2014/main" val="572351887"/>
+                      <a16:colId xmlns:a16="http://schemas.microsoft.com/office/drawing/2014/main" val="1944225687"/>
                     </a:ext>
                   </a:extLst>
                 </a:gridCol>
                 <a:gridCol w="2709333">
                   <a:extLst>
                     <a:ext uri="{9D8B030D-6E8A-4147-A177-3AD203B41FA5}">
-                      <a16:colId xmlns:a16="http://schemas.microsoft.com/office/drawing/2014/main" val="3040943600"/>
+                      <a16:colId xmlns:a16="http://schemas.microsoft.com/office/drawing/2014/main" val="2093173947"/>
                     </a:ext>
                   </a:extLst>
                 </a:gridCol>
               </a:tblGrid>
+              <a:tr h="877711">
+                <a:tc>
+                  <a:txBody>
+                    <a:bodyPr/>
+                    <a:lstStyle/>
+                    <a:p>
+                      <a:r>
+                        <a:rPr lang="en-AU" dirty="0">
+                          <a:solidFill>
+                            <a:schemeClr val="tx1"/>
+                          </a:solidFill>
+                        </a:rPr>
+                        <a:t>Artist</a:t>
+                      </a:r>
+                    </a:p>
+                  </a:txBody>
+                  <a:tcPr>
+                    <a:lnL w="12700" cap="flat" cmpd="sng" algn="ctr">
+                      <a:solidFill>
+                        <a:schemeClr val="tx1"/>
+                      </a:solidFill>
+                      <a:prstDash val="solid"/>
+                      <a:round/>
+                      <a:headEnd type="none" w="med" len="med"/>
+                      <a:tailEnd type="none" w="med" len="med"/>
+                    </a:lnL>
+                    <a:lnR w="12700" cap="flat" cmpd="sng" algn="ctr">
+                      <a:solidFill>
+                        <a:schemeClr val="tx1"/>
+                      </a:solidFill>
+                      <a:prstDash val="solid"/>
+                      <a:round/>
+                      <a:headEnd type="none" w="med" len="med"/>
+                      <a:tailEnd type="none" w="med" len="med"/>
+                    </a:lnR>
+                    <a:lnT w="12700" cap="flat" cmpd="sng" algn="ctr">
+                      <a:solidFill>
+                        <a:schemeClr val="tx1"/>
+                      </a:solidFill>
+                      <a:prstDash val="solid"/>
+                      <a:round/>
+                      <a:headEnd type="none" w="med" len="med"/>
+                      <a:tailEnd type="none" w="med" len="med"/>
+                    </a:lnT>
+                    <a:lnB w="12700" cap="flat" cmpd="sng" algn="ctr">
+                      <a:solidFill>
+                        <a:schemeClr val="tx1"/>
+                      </a:solidFill>
+                      <a:prstDash val="solid"/>
+                      <a:round/>
+                      <a:headEnd type="none" w="med" len="med"/>
+                      <a:tailEnd type="none" w="med" len="med"/>
+                    </a:lnB>
+                    <a:noFill/>
+                  </a:tcPr>
+                </a:tc>
+                <a:tc>
+                  <a:txBody>
+                    <a:bodyPr/>
+                    <a:lstStyle/>
+                    <a:p>
+                      <a:r>
+                        <a:rPr lang="en-AU" dirty="0">
+                          <a:solidFill>
+                            <a:schemeClr val="tx1"/>
+                          </a:solidFill>
+                        </a:rPr>
+                        <a:t>Song</a:t>
+                      </a:r>
+                    </a:p>
+                  </a:txBody>
+                  <a:tcPr>
+                    <a:lnL w="12700" cap="flat" cmpd="sng" algn="ctr">
+                      <a:solidFill>
+                        <a:schemeClr val="tx1"/>
+                      </a:solidFill>
+                      <a:prstDash val="solid"/>
+                      <a:round/>
+                      <a:headEnd type="none" w="med" len="med"/>
+                      <a:tailEnd type="none" w="med" len="med"/>
+                    </a:lnL>
+                    <a:lnR w="12700" cap="flat" cmpd="sng" algn="ctr">
+                      <a:solidFill>
+                        <a:schemeClr val="tx1"/>
+                      </a:solidFill>
+                      <a:prstDash val="solid"/>
+                      <a:round/>
+                      <a:headEnd type="none" w="med" len="med"/>
+                      <a:tailEnd type="none" w="med" len="med"/>
+                    </a:lnR>
+                    <a:lnT w="12700" cap="flat" cmpd="sng" algn="ctr">
+                      <a:solidFill>
+                        <a:schemeClr val="tx1"/>
+                      </a:solidFill>
+                      <a:prstDash val="solid"/>
+                      <a:round/>
+                      <a:headEnd type="none" w="med" len="med"/>
+                      <a:tailEnd type="none" w="med" len="med"/>
+                    </a:lnT>
+                    <a:lnB w="12700" cap="flat" cmpd="sng" algn="ctr">
+                      <a:solidFill>
+                        <a:schemeClr val="tx1"/>
+                      </a:solidFill>
+                      <a:prstDash val="solid"/>
+                      <a:round/>
+                      <a:headEnd type="none" w="med" len="med"/>
+                      <a:tailEnd type="none" w="med" len="med"/>
+                    </a:lnB>
+                    <a:noFill/>
+                  </a:tcPr>
+                </a:tc>
+                <a:tc>
+                  <a:txBody>
+                    <a:bodyPr/>
+                    <a:lstStyle/>
+                    <a:p>
+                      <a:r>
+                        <a:rPr lang="en-AU" dirty="0" err="1">
+                          <a:solidFill>
+                            <a:schemeClr val="tx1"/>
+                          </a:solidFill>
+                        </a:rPr>
+                        <a:t>AlbumTitle</a:t>
+                      </a:r>
+                      <a:endParaRPr lang="en-AU" dirty="0">
+                        <a:solidFill>
+                          <a:schemeClr val="tx1"/>
+                        </a:solidFill>
+                      </a:endParaRPr>
+                    </a:p>
+                  </a:txBody>
+                  <a:tcPr>
+                    <a:lnL w="12700" cap="flat" cmpd="sng" algn="ctr">
+                      <a:solidFill>
+                        <a:schemeClr val="tx1"/>
+                      </a:solidFill>
+                      <a:prstDash val="solid"/>
+                      <a:round/>
+                      <a:headEnd type="none" w="med" len="med"/>
+                      <a:tailEnd type="none" w="med" len="med"/>
+                    </a:lnL>
+                    <a:lnR w="12700" cap="flat" cmpd="sng" algn="ctr">
+                      <a:solidFill>
+                        <a:schemeClr val="tx1"/>
+                      </a:solidFill>
+                      <a:prstDash val="solid"/>
+                      <a:round/>
+                      <a:headEnd type="none" w="med" len="med"/>
+                      <a:tailEnd type="none" w="med" len="med"/>
+                    </a:lnR>
+                    <a:lnT w="12700" cap="flat" cmpd="sng" algn="ctr">
+                      <a:solidFill>
+                        <a:schemeClr val="tx1"/>
+                      </a:solidFill>
+                      <a:prstDash val="solid"/>
+                      <a:round/>
+                      <a:headEnd type="none" w="med" len="med"/>
+                      <a:tailEnd type="none" w="med" len="med"/>
+                    </a:lnT>
+                    <a:lnB w="12700" cap="flat" cmpd="sng" algn="ctr">
+                      <a:solidFill>
+                        <a:schemeClr val="tx1"/>
+                      </a:solidFill>
+                      <a:prstDash val="solid"/>
+                      <a:round/>
+                      <a:headEnd type="none" w="med" len="med"/>
+                      <a:tailEnd type="none" w="med" len="med"/>
+                    </a:lnB>
+                    <a:noFill/>
+                  </a:tcPr>
+                </a:tc>
+                <a:extLst>
+                  <a:ext uri="{0D108BD9-81ED-4DB2-BD59-A6C34878D82A}">
+                    <a16:rowId xmlns:a16="http://schemas.microsoft.com/office/drawing/2014/main" val="1382315626"/>
+                  </a:ext>
+                </a:extLst>
+              </a:tr>
               <a:tr h="877711">
                 <a:tc>
                   <a:txBody>
@@ -38497,7 +38946,7 @@
                 </a:tc>
                 <a:extLst>
                   <a:ext uri="{0D108BD9-81ED-4DB2-BD59-A6C34878D82A}">
-                    <a16:rowId xmlns:a16="http://schemas.microsoft.com/office/drawing/2014/main" val="2056596917"/>
+                    <a16:rowId xmlns:a16="http://schemas.microsoft.com/office/drawing/2014/main" val="704033187"/>
                   </a:ext>
                 </a:extLst>
               </a:tr>
@@ -38678,7 +39127,7 @@
                 </a:tc>
                 <a:extLst>
                   <a:ext uri="{0D108BD9-81ED-4DB2-BD59-A6C34878D82A}">
-                    <a16:rowId xmlns:a16="http://schemas.microsoft.com/office/drawing/2014/main" val="706944331"/>
+                    <a16:rowId xmlns:a16="http://schemas.microsoft.com/office/drawing/2014/main" val="247476957"/>
                   </a:ext>
                 </a:extLst>
               </a:tr>
@@ -38686,78 +39135,6 @@
           </a:graphicData>
         </a:graphic>
       </p:graphicFrame>
-      <p:sp>
-        <p:nvSpPr>
-          <p:cNvPr id="6" name="Title 1">
-            <a:extLst>
-              <a:ext uri="{FF2B5EF4-FFF2-40B4-BE49-F238E27FC236}">
-                <a16:creationId xmlns:a16="http://schemas.microsoft.com/office/drawing/2014/main" id="{E3DF4675-0FA0-47ED-8B33-4F5D225F65E4}"/>
-              </a:ext>
-            </a:extLst>
-          </p:cNvPr>
-          <p:cNvSpPr txBox="1">
-            <a:spLocks/>
-          </p:cNvSpPr>
-          <p:nvPr/>
-        </p:nvSpPr>
-        <p:spPr>
-          <a:xfrm>
-            <a:off x="755516" y="3229867"/>
-            <a:ext cx="3443260" cy="704476"/>
-          </a:xfrm>
-          <a:prstGeom prst="rect">
-            <a:avLst/>
-          </a:prstGeom>
-        </p:spPr>
-        <p:txBody>
-          <a:bodyPr vert="horz" lIns="91440" tIns="45720" rIns="91440" bIns="45720" rtlCol="0" anchor="ctr">
-            <a:normAutofit/>
-          </a:bodyPr>
-          <a:lstStyle>
-            <a:lvl1pPr algn="l" defTabSz="914400" rtl="0" eaLnBrk="1" latinLnBrk="0" hangingPunct="1">
-              <a:lnSpc>
-                <a:spcPct val="90000"/>
-              </a:lnSpc>
-              <a:spcBef>
-                <a:spcPct val="0"/>
-              </a:spcBef>
-              <a:buNone/>
-              <a:defRPr sz="4400" kern="1200">
-                <a:solidFill>
-                  <a:schemeClr val="tx1"/>
-                </a:solidFill>
-                <a:latin typeface="+mj-lt"/>
-                <a:ea typeface="+mj-ea"/>
-                <a:cs typeface="+mj-cs"/>
-              </a:defRPr>
-            </a:lvl1pPr>
-          </a:lstStyle>
-          <a:p>
-            <a:pPr marL="342900" indent="-342900" fontAlgn="auto">
-              <a:spcAft>
-                <a:spcPts val="0"/>
-              </a:spcAft>
-              <a:buClrTx/>
-              <a:buSzTx/>
-              <a:buFont typeface="Arial" panose="020B0604020202020204" pitchFamily="34" charset="0"/>
-              <a:buChar char="•"/>
-            </a:pPr>
-            <a:r>
-              <a:rPr lang="en-AU" sz="2400" dirty="0">
-                <a:latin typeface="+mn-lt"/>
-                <a:ea typeface="+mn-ea"/>
-                <a:cs typeface="+mn-cs"/>
-              </a:rPr>
-              <a:t>Table output:</a:t>
-            </a:r>
-            <a:endParaRPr lang="en-US" sz="2400" dirty="0">
-              <a:latin typeface="+mn-lt"/>
-              <a:ea typeface="+mn-ea"/>
-              <a:cs typeface="+mn-cs"/>
-            </a:endParaRPr>
-          </a:p>
-        </p:txBody>
-      </p:sp>
     </p:spTree>
     <p:extLst>
       <p:ext uri="{BB962C8B-B14F-4D97-AF65-F5344CB8AC3E}">

</xml_diff>